<commit_message>
fixed issues with workflow_2 graph
</commit_message>
<xml_diff>
--- a/example_workflow_2/provenance/workflow_2_graph.pptx
+++ b/example_workflow_2/provenance/workflow_2_graph.pptx
@@ -112,15 +112,6 @@
 </p:presentation>
 </file>
 
-<file path=ppt/revisionInfo.xml><?xml version="1.0" encoding="utf-8"?>
-<p1510:revInfo xmlns:a="http://schemas.openxmlformats.org/drawingml/2006/main" xmlns:r="http://schemas.openxmlformats.org/officeDocument/2006/relationships" xmlns:p1510="http://schemas.microsoft.com/office/powerpoint/2015/10/main">
-  <p1510:revLst>
-    <p1510:client id="{7703DDF1-2F33-4E6E-99AF-5938D7FA564E}" v="49" dt="2023-10-20T21:44:50.119"/>
-    <p1510:client id="{F50A8463-7740-44B0-A089-F526194E51AF}" v="31" dt="2023-10-20T23:40:44.125"/>
-  </p1510:revLst>
-</p1510:revInfo>
-</file>
-
 <file path=ppt/changesInfos/changesInfo1.xml><?xml version="1.0" encoding="utf-8"?>
 <pc:chgInfo xmlns:a="http://schemas.openxmlformats.org/drawingml/2006/main" xmlns:r="http://schemas.openxmlformats.org/officeDocument/2006/relationships" xmlns:ac="http://schemas.microsoft.com/office/drawing/2013/main/command" xmlns:pc="http://schemas.microsoft.com/office/powerpoint/2013/main/command">
   <pc:docChgLst>
@@ -3410,6 +3401,70 @@
             <pc:docMk/>
             <pc:sldMk cId="1645475767" sldId="256"/>
             <ac:cxnSpMk id="293" creationId="{465BFAD8-046F-A3E1-6259-03C898568E09}"/>
+          </ac:cxnSpMkLst>
+        </pc:cxnChg>
+      </pc:sldChg>
+    </pc:docChg>
+  </pc:docChgLst>
+  <pc:docChgLst>
+    <pc:chgData name="Joseph Wonsil" userId="f7a5a8f17f3cf2df" providerId="LiveId" clId="{ED12D298-D7BE-4F30-8F27-F73650359F41}"/>
+    <pc:docChg chg="custSel modSld">
+      <pc:chgData name="Joseph Wonsil" userId="f7a5a8f17f3cf2df" providerId="LiveId" clId="{ED12D298-D7BE-4F30-8F27-F73650359F41}" dt="2023-10-24T20:24:50.933" v="9" actId="14100"/>
+      <pc:docMkLst>
+        <pc:docMk/>
+      </pc:docMkLst>
+      <pc:sldChg chg="delSp modSp mod">
+        <pc:chgData name="Joseph Wonsil" userId="f7a5a8f17f3cf2df" providerId="LiveId" clId="{ED12D298-D7BE-4F30-8F27-F73650359F41}" dt="2023-10-24T20:24:50.933" v="9" actId="14100"/>
+        <pc:sldMkLst>
+          <pc:docMk/>
+          <pc:sldMk cId="1645475767" sldId="256"/>
+        </pc:sldMkLst>
+        <pc:spChg chg="mod">
+          <ac:chgData name="Joseph Wonsil" userId="f7a5a8f17f3cf2df" providerId="LiveId" clId="{ED12D298-D7BE-4F30-8F27-F73650359F41}" dt="2023-10-24T20:24:37.059" v="5" actId="14100"/>
+          <ac:spMkLst>
+            <pc:docMk/>
+            <pc:sldMk cId="1645475767" sldId="256"/>
+            <ac:spMk id="2" creationId="{107A250A-CB8B-A1D4-5234-3830B0F729AE}"/>
+          </ac:spMkLst>
+        </pc:spChg>
+        <pc:spChg chg="del">
+          <ac:chgData name="Joseph Wonsil" userId="f7a5a8f17f3cf2df" providerId="LiveId" clId="{ED12D298-D7BE-4F30-8F27-F73650359F41}" dt="2023-10-24T20:24:01.860" v="0" actId="478"/>
+          <ac:spMkLst>
+            <pc:docMk/>
+            <pc:sldMk cId="1645475767" sldId="256"/>
+            <ac:spMk id="49" creationId="{F2937267-9F1C-C58F-8739-E255F892AC3B}"/>
+          </ac:spMkLst>
+        </pc:spChg>
+        <pc:spChg chg="mod">
+          <ac:chgData name="Joseph Wonsil" userId="f7a5a8f17f3cf2df" providerId="LiveId" clId="{ED12D298-D7BE-4F30-8F27-F73650359F41}" dt="2023-10-24T20:24:44.077" v="7" actId="14100"/>
+          <ac:spMkLst>
+            <pc:docMk/>
+            <pc:sldMk cId="1645475767" sldId="256"/>
+            <ac:spMk id="89" creationId="{1C81BC0B-3388-F0D2-F6D1-121962D2AA55}"/>
+          </ac:spMkLst>
+        </pc:spChg>
+        <pc:spChg chg="mod">
+          <ac:chgData name="Joseph Wonsil" userId="f7a5a8f17f3cf2df" providerId="LiveId" clId="{ED12D298-D7BE-4F30-8F27-F73650359F41}" dt="2023-10-24T20:24:47.087" v="8" actId="14100"/>
+          <ac:spMkLst>
+            <pc:docMk/>
+            <pc:sldMk cId="1645475767" sldId="256"/>
+            <ac:spMk id="96" creationId="{ACF845C9-F512-1D84-4A26-6760DFEC5447}"/>
+          </ac:spMkLst>
+        </pc:spChg>
+        <pc:spChg chg="mod">
+          <ac:chgData name="Joseph Wonsil" userId="f7a5a8f17f3cf2df" providerId="LiveId" clId="{ED12D298-D7BE-4F30-8F27-F73650359F41}" dt="2023-10-24T20:24:50.933" v="9" actId="14100"/>
+          <ac:spMkLst>
+            <pc:docMk/>
+            <pc:sldMk cId="1645475767" sldId="256"/>
+            <ac:spMk id="178" creationId="{BB910607-4CC2-7521-B671-C0EAE4C2FAE3}"/>
+          </ac:spMkLst>
+        </pc:spChg>
+        <pc:cxnChg chg="mod">
+          <ac:chgData name="Joseph Wonsil" userId="f7a5a8f17f3cf2df" providerId="LiveId" clId="{ED12D298-D7BE-4F30-8F27-F73650359F41}" dt="2023-10-24T20:24:40.175" v="6" actId="14100"/>
+          <ac:cxnSpMkLst>
+            <pc:docMk/>
+            <pc:sldMk cId="1645475767" sldId="256"/>
+            <ac:cxnSpMk id="4" creationId="{1FAF49EF-246B-5065-399F-6F3D99F68D6C}"/>
           </ac:cxnSpMkLst>
         </pc:cxnChg>
       </pc:sldChg>
@@ -7811,7 +7866,7 @@
           <a:p>
             <a:fld id="{4DAAF268-B108-415A-8D22-4C329ED559E0}" type="datetimeFigureOut">
               <a:rPr lang="en-US" smtClean="0"/>
-              <a:t>10/20/2023</a:t>
+              <a:t>10/24/2023</a:t>
             </a:fld>
             <a:endParaRPr lang="en-US"/>
           </a:p>
@@ -7981,7 +8036,7 @@
           <a:p>
             <a:fld id="{4DAAF268-B108-415A-8D22-4C329ED559E0}" type="datetimeFigureOut">
               <a:rPr lang="en-US" smtClean="0"/>
-              <a:t>10/20/2023</a:t>
+              <a:t>10/24/2023</a:t>
             </a:fld>
             <a:endParaRPr lang="en-US"/>
           </a:p>
@@ -8161,7 +8216,7 @@
           <a:p>
             <a:fld id="{4DAAF268-B108-415A-8D22-4C329ED559E0}" type="datetimeFigureOut">
               <a:rPr lang="en-US" smtClean="0"/>
-              <a:t>10/20/2023</a:t>
+              <a:t>10/24/2023</a:t>
             </a:fld>
             <a:endParaRPr lang="en-US"/>
           </a:p>
@@ -8331,7 +8386,7 @@
           <a:p>
             <a:fld id="{4DAAF268-B108-415A-8D22-4C329ED559E0}" type="datetimeFigureOut">
               <a:rPr lang="en-US" smtClean="0"/>
-              <a:t>10/20/2023</a:t>
+              <a:t>10/24/2023</a:t>
             </a:fld>
             <a:endParaRPr lang="en-US"/>
           </a:p>
@@ -8575,7 +8630,7 @@
           <a:p>
             <a:fld id="{4DAAF268-B108-415A-8D22-4C329ED559E0}" type="datetimeFigureOut">
               <a:rPr lang="en-US" smtClean="0"/>
-              <a:t>10/20/2023</a:t>
+              <a:t>10/24/2023</a:t>
             </a:fld>
             <a:endParaRPr lang="en-US"/>
           </a:p>
@@ -8807,7 +8862,7 @@
           <a:p>
             <a:fld id="{4DAAF268-B108-415A-8D22-4C329ED559E0}" type="datetimeFigureOut">
               <a:rPr lang="en-US" smtClean="0"/>
-              <a:t>10/20/2023</a:t>
+              <a:t>10/24/2023</a:t>
             </a:fld>
             <a:endParaRPr lang="en-US"/>
           </a:p>
@@ -9174,7 +9229,7 @@
           <a:p>
             <a:fld id="{4DAAF268-B108-415A-8D22-4C329ED559E0}" type="datetimeFigureOut">
               <a:rPr lang="en-US" smtClean="0"/>
-              <a:t>10/20/2023</a:t>
+              <a:t>10/24/2023</a:t>
             </a:fld>
             <a:endParaRPr lang="en-US"/>
           </a:p>
@@ -9292,7 +9347,7 @@
           <a:p>
             <a:fld id="{4DAAF268-B108-415A-8D22-4C329ED559E0}" type="datetimeFigureOut">
               <a:rPr lang="en-US" smtClean="0"/>
-              <a:t>10/20/2023</a:t>
+              <a:t>10/24/2023</a:t>
             </a:fld>
             <a:endParaRPr lang="en-US"/>
           </a:p>
@@ -9387,7 +9442,7 @@
           <a:p>
             <a:fld id="{4DAAF268-B108-415A-8D22-4C329ED559E0}" type="datetimeFigureOut">
               <a:rPr lang="en-US" smtClean="0"/>
-              <a:t>10/20/2023</a:t>
+              <a:t>10/24/2023</a:t>
             </a:fld>
             <a:endParaRPr lang="en-US"/>
           </a:p>
@@ -9664,7 +9719,7 @@
           <a:p>
             <a:fld id="{4DAAF268-B108-415A-8D22-4C329ED559E0}" type="datetimeFigureOut">
               <a:rPr lang="en-US" smtClean="0"/>
-              <a:t>10/20/2023</a:t>
+              <a:t>10/24/2023</a:t>
             </a:fld>
             <a:endParaRPr lang="en-US"/>
           </a:p>
@@ -9921,7 +9976,7 @@
           <a:p>
             <a:fld id="{4DAAF268-B108-415A-8D22-4C329ED559E0}" type="datetimeFigureOut">
               <a:rPr lang="en-US" smtClean="0"/>
-              <a:t>10/20/2023</a:t>
+              <a:t>10/24/2023</a:t>
             </a:fld>
             <a:endParaRPr lang="en-US"/>
           </a:p>
@@ -10134,7 +10189,7 @@
           <a:p>
             <a:fld id="{4DAAF268-B108-415A-8D22-4C329ED559E0}" type="datetimeFigureOut">
               <a:rPr lang="en-US" smtClean="0"/>
-              <a:t>10/20/2023</a:t>
+              <a:t>10/24/2023</a:t>
             </a:fld>
             <a:endParaRPr lang="en-US"/>
           </a:p>
@@ -11083,7 +11138,7 @@
           </a:xfrm>
           <a:prstGeom prst="bentConnector3">
             <a:avLst>
-              <a:gd name="adj1" fmla="val 50000"/>
+              <a:gd name="adj1" fmla="val 54609"/>
             </a:avLst>
           </a:prstGeom>
           <a:ln w="19050">
@@ -11946,7 +12001,7 @@
         <p:spPr>
           <a:xfrm>
             <a:off x="1149238" y="9229766"/>
-            <a:ext cx="6491964" cy="449671"/>
+            <a:ext cx="5577026" cy="449671"/>
           </a:xfrm>
           <a:prstGeom prst="rect">
             <a:avLst/>
@@ -12004,7 +12059,7 @@
                 <a:ea typeface="+mn-lt"/>
                 <a:cs typeface="+mn-lt"/>
               </a:rPr>
-              <a:t>/bin/python3 preprocess.py train_model.py --</a:t>
+              <a:t>/bin/python3 train_model.py --</a:t>
             </a:r>
             <a:r>
               <a:rPr lang="en-US" sz="1500" dirty="0" err="1">
@@ -13188,7 +13243,7 @@
         <p:spPr>
           <a:xfrm>
             <a:off x="1154843" y="520024"/>
-            <a:ext cx="6486359" cy="449671"/>
+            <a:ext cx="5245957" cy="449671"/>
           </a:xfrm>
           <a:prstGeom prst="rect">
             <a:avLst/>
@@ -13245,7 +13300,7 @@
             </a:r>
             <a:r>
               <a:rPr lang="en-US" sz="1500" dirty="0"/>
-              <a:t>preprocess.py train_model.py --</a:t>
+              <a:t>train_model.py --</a:t>
             </a:r>
             <a:r>
               <a:rPr lang="en-US" sz="1500" dirty="0" err="1"/>
@@ -13897,54 +13952,6 @@
           </a:p>
         </p:txBody>
       </p:sp>
-      <p:sp>
-        <p:nvSpPr>
-          <p:cNvPr id="49" name="Rectangle 48">
-            <a:extLst>
-              <a:ext uri="{FF2B5EF4-FFF2-40B4-BE49-F238E27FC236}">
-                <a16:creationId xmlns:a16="http://schemas.microsoft.com/office/drawing/2014/main" id="{F2937267-9F1C-C58F-8739-E255F892AC3B}"/>
-              </a:ext>
-            </a:extLst>
-          </p:cNvPr>
-          <p:cNvSpPr/>
-          <p:nvPr/>
-        </p:nvSpPr>
-        <p:spPr>
-          <a:xfrm>
-            <a:off x="12338676" y="6984303"/>
-            <a:ext cx="2154006" cy="381928"/>
-          </a:xfrm>
-          <a:prstGeom prst="rect">
-            <a:avLst/>
-          </a:prstGeom>
-        </p:spPr>
-        <p:style>
-          <a:lnRef idx="2">
-            <a:schemeClr val="dk1"/>
-          </a:lnRef>
-          <a:fillRef idx="1">
-            <a:schemeClr val="lt1"/>
-          </a:fillRef>
-          <a:effectRef idx="0">
-            <a:schemeClr val="dk1"/>
-          </a:effectRef>
-          <a:fontRef idx="minor">
-            <a:schemeClr val="dk1"/>
-          </a:fontRef>
-        </p:style>
-        <p:txBody>
-          <a:bodyPr lIns="114301" tIns="57150" rIns="114301" bIns="57150" rtlCol="0" anchor="ctr"/>
-          <a:lstStyle/>
-          <a:p>
-            <a:pPr algn="ctr"/>
-            <a:r>
-              <a:rPr lang="en-US" sz="1500" dirty="0"/>
-              <a:t>/home/pr/exp2/data.csv</a:t>
-            </a:r>
-            <a:endParaRPr lang="en-US" sz="2250" dirty="0"/>
-          </a:p>
-        </p:txBody>
-      </p:sp>
       <p:cxnSp>
         <p:nvCxnSpPr>
           <p:cNvPr id="50" name="Straight Arrow Connector 49">
@@ -14460,7 +14467,7 @@
         <p:spPr>
           <a:xfrm>
             <a:off x="1154349" y="4853681"/>
-            <a:ext cx="6486359" cy="449671"/>
+            <a:ext cx="5370437" cy="449671"/>
           </a:xfrm>
           <a:prstGeom prst="rect">
             <a:avLst/>
@@ -14521,7 +14528,7 @@
             </a:r>
             <a:r>
               <a:rPr lang="en-US" sz="1500" dirty="0"/>
-              <a:t>preprocess.py train_model.py --</a:t>
+              <a:t>train_model.py --</a:t>
             </a:r>
             <a:r>
               <a:rPr lang="en-US" sz="1500" dirty="0" err="1"/>
@@ -14857,8 +14864,8 @@
         </p:nvSpPr>
         <p:spPr>
           <a:xfrm>
-            <a:off x="1062279" y="12936569"/>
-            <a:ext cx="5203349" cy="449671"/>
+            <a:off x="1062280" y="12936569"/>
+            <a:ext cx="4269138" cy="449671"/>
           </a:xfrm>
           <a:prstGeom prst="rect">
             <a:avLst/>
@@ -14916,7 +14923,7 @@
                 <a:ea typeface="+mn-lt"/>
                 <a:cs typeface="+mn-lt"/>
               </a:rPr>
-              <a:t>/bin/python3 preprocess.py evaluate_models.py </a:t>
+              <a:t>/bin/python3 evaluate_models.py </a:t>
             </a:r>
           </a:p>
         </p:txBody>

</xml_diff>